<commit_message>
added updated computer networks slides
</commit_message>
<xml_diff>
--- a/COMPUTER NETWORKS/FINAL/SLIDES/CN Lecture 08 Error control codes.pptx
+++ b/COMPUTER NETWORKS/FINAL/SLIDES/CN Lecture 08 Error control codes.pptx
@@ -300,7 +300,7 @@
   <pc:docChgLst>
     <pc:chgData name="MD. FARUK ABDULLAH AL SOHAN" userId="49b838b6-cc57-4ff1-b78b-f35f84b7c1b1" providerId="ADAL" clId="{3E4D9F8D-7730-4003-8AAC-3F02B43FF378}"/>
     <pc:docChg chg="modSld">
-      <pc:chgData name="MD. FARUK ABDULLAH AL SOHAN" userId="49b838b6-cc57-4ff1-b78b-f35f84b7c1b1" providerId="ADAL" clId="{3E4D9F8D-7730-4003-8AAC-3F02B43FF378}" dt="2024-08-18T03:34:17.945" v="31" actId="1076"/>
+      <pc:chgData name="MD. FARUK ABDULLAH AL SOHAN" userId="49b838b6-cc57-4ff1-b78b-f35f84b7c1b1" providerId="ADAL" clId="{3E4D9F8D-7730-4003-8AAC-3F02B43FF378}" dt="2024-09-08T02:17:22.241" v="40" actId="20577"/>
       <pc:docMkLst>
         <pc:docMk/>
       </pc:docMkLst>
@@ -320,7 +320,7 @@
         </pc:spChg>
       </pc:sldChg>
       <pc:sldChg chg="addSp modSp mod">
-        <pc:chgData name="MD. FARUK ABDULLAH AL SOHAN" userId="49b838b6-cc57-4ff1-b78b-f35f84b7c1b1" providerId="ADAL" clId="{3E4D9F8D-7730-4003-8AAC-3F02B43FF378}" dt="2024-08-18T03:34:17.945" v="31" actId="1076"/>
+        <pc:chgData name="MD. FARUK ABDULLAH AL SOHAN" userId="49b838b6-cc57-4ff1-b78b-f35f84b7c1b1" providerId="ADAL" clId="{3E4D9F8D-7730-4003-8AAC-3F02B43FF378}" dt="2024-09-08T02:17:22.241" v="40" actId="20577"/>
         <pc:sldMkLst>
           <pc:docMk/>
           <pc:sldMk cId="2682823847" sldId="300"/>
@@ -334,7 +334,7 @@
           </ac:spMkLst>
         </pc:spChg>
         <pc:spChg chg="add mod">
-          <ac:chgData name="MD. FARUK ABDULLAH AL SOHAN" userId="49b838b6-cc57-4ff1-b78b-f35f84b7c1b1" providerId="ADAL" clId="{3E4D9F8D-7730-4003-8AAC-3F02B43FF378}" dt="2024-08-18T03:34:17.945" v="31" actId="1076"/>
+          <ac:chgData name="MD. FARUK ABDULLAH AL SOHAN" userId="49b838b6-cc57-4ff1-b78b-f35f84b7c1b1" providerId="ADAL" clId="{3E4D9F8D-7730-4003-8AAC-3F02B43FF378}" dt="2024-09-08T02:17:22.241" v="40" actId="20577"/>
           <ac:spMkLst>
             <pc:docMk/>
             <pc:sldMk cId="2682823847" sldId="300"/>
@@ -524,7 +524,7 @@
           <a:p>
             <a:fld id="{AFC5EADC-BDA4-471B-8560-0CF8B29AA526}" type="datetimeFigureOut">
               <a:rPr lang="en-US" smtClean="0"/>
-              <a:t>18-Aug-24</a:t>
+              <a:t>08-Sep-24</a:t>
             </a:fld>
             <a:endParaRPr lang="en-US"/>
           </a:p>
@@ -993,7 +993,7 @@
           <a:p>
             <a:fld id="{4251665B-C24A-4702-B522-6A4334602E03}" type="datetimeFigureOut">
               <a:rPr lang="en-US" smtClean="0"/>
-              <a:t>18-Aug-24</a:t>
+              <a:t>08-Sep-24</a:t>
             </a:fld>
             <a:endParaRPr lang="en-US"/>
           </a:p>
@@ -1758,7 +1758,7 @@
           <a:p>
             <a:fld id="{4251665B-C24A-4702-B522-6A4334602E03}" type="datetimeFigureOut">
               <a:rPr lang="en-US" smtClean="0"/>
-              <a:t>18-Aug-24</a:t>
+              <a:t>08-Sep-24</a:t>
             </a:fld>
             <a:endParaRPr lang="en-US"/>
           </a:p>
@@ -2382,7 +2382,7 @@
           <a:p>
             <a:fld id="{4251665B-C24A-4702-B522-6A4334602E03}" type="datetimeFigureOut">
               <a:rPr lang="en-US" smtClean="0"/>
-              <a:t>18-Aug-24</a:t>
+              <a:t>08-Sep-24</a:t>
             </a:fld>
             <a:endParaRPr lang="en-US"/>
           </a:p>
@@ -2805,7 +2805,7 @@
           <a:p>
             <a:fld id="{4251665B-C24A-4702-B522-6A4334602E03}" type="datetimeFigureOut">
               <a:rPr lang="en-US" smtClean="0"/>
-              <a:t>18-Aug-24</a:t>
+              <a:t>08-Sep-24</a:t>
             </a:fld>
             <a:endParaRPr lang="en-US"/>
           </a:p>
@@ -2982,7 +2982,7 @@
           <a:p>
             <a:fld id="{4251665B-C24A-4702-B522-6A4334602E03}" type="datetimeFigureOut">
               <a:rPr lang="en-US" smtClean="0"/>
-              <a:t>18-Aug-24</a:t>
+              <a:t>08-Sep-24</a:t>
             </a:fld>
             <a:endParaRPr lang="en-US"/>
           </a:p>
@@ -3799,7 +3799,7 @@
           <a:p>
             <a:fld id="{4251665B-C24A-4702-B522-6A4334602E03}" type="datetimeFigureOut">
               <a:rPr lang="en-US" smtClean="0"/>
-              <a:t>18-Aug-24</a:t>
+              <a:t>08-Sep-24</a:t>
             </a:fld>
             <a:endParaRPr lang="en-US"/>
           </a:p>
@@ -4310,7 +4310,7 @@
           <a:p>
             <a:fld id="{4251665B-C24A-4702-B522-6A4334602E03}" type="datetimeFigureOut">
               <a:rPr lang="en-US" smtClean="0"/>
-              <a:t>18-Aug-24</a:t>
+              <a:t>08-Sep-24</a:t>
             </a:fld>
             <a:endParaRPr lang="en-US"/>
           </a:p>
@@ -4543,7 +4543,7 @@
           <a:p>
             <a:fld id="{4251665B-C24A-4702-B522-6A4334602E03}" type="datetimeFigureOut">
               <a:rPr lang="en-US" smtClean="0"/>
-              <a:t>18-Aug-24</a:t>
+              <a:t>08-Sep-24</a:t>
             </a:fld>
             <a:endParaRPr lang="en-US"/>
           </a:p>
@@ -5068,7 +5068,7 @@
           <a:p>
             <a:fld id="{4251665B-C24A-4702-B522-6A4334602E03}" type="datetimeFigureOut">
               <a:rPr lang="en-US" smtClean="0"/>
-              <a:t>18-Aug-24</a:t>
+              <a:t>08-Sep-24</a:t>
             </a:fld>
             <a:endParaRPr lang="en-US"/>
           </a:p>
@@ -5203,7 +5203,7 @@
           <a:p>
             <a:fld id="{4251665B-C24A-4702-B522-6A4334602E03}" type="datetimeFigureOut">
               <a:rPr lang="en-US" smtClean="0"/>
-              <a:t>18-Aug-24</a:t>
+              <a:t>08-Sep-24</a:t>
             </a:fld>
             <a:endParaRPr lang="en-US"/>
           </a:p>
@@ -6101,7 +6101,7 @@
           <a:p>
             <a:fld id="{4251665B-C24A-4702-B522-6A4334602E03}" type="datetimeFigureOut">
               <a:rPr lang="en-US" smtClean="0"/>
-              <a:t>18-Aug-24</a:t>
+              <a:t>08-Sep-24</a:t>
             </a:fld>
             <a:endParaRPr lang="en-US"/>
           </a:p>
@@ -6224,7 +6224,7 @@
           <a:p>
             <a:fld id="{4251665B-C24A-4702-B522-6A4334602E03}" type="datetimeFigureOut">
               <a:rPr lang="en-US" smtClean="0"/>
-              <a:t>18-Aug-24</a:t>
+              <a:t>08-Sep-24</a:t>
             </a:fld>
             <a:endParaRPr lang="en-US"/>
           </a:p>
@@ -7108,7 +7108,7 @@
           <a:p>
             <a:fld id="{4251665B-C24A-4702-B522-6A4334602E03}" type="datetimeFigureOut">
               <a:rPr lang="en-US" smtClean="0"/>
-              <a:t>18-Aug-24</a:t>
+              <a:t>08-Sep-24</a:t>
             </a:fld>
             <a:endParaRPr lang="en-US"/>
           </a:p>
@@ -7756,7 +7756,7 @@
           <a:p>
             <a:fld id="{4251665B-C24A-4702-B522-6A4334602E03}" type="datetimeFigureOut">
               <a:rPr lang="en-US" smtClean="0"/>
-              <a:t>18-Aug-24</a:t>
+              <a:t>08-Sep-24</a:t>
             </a:fld>
             <a:endParaRPr lang="en-US"/>
           </a:p>
@@ -8072,7 +8072,7 @@
           <a:p>
             <a:fld id="{4251665B-C24A-4702-B522-6A4334602E03}" type="datetimeFigureOut">
               <a:rPr lang="en-US" smtClean="0"/>
-              <a:t>18-Aug-24</a:t>
+              <a:t>08-Sep-24</a:t>
             </a:fld>
             <a:endParaRPr lang="en-US"/>
           </a:p>
@@ -8162,7 +8162,7 @@
           <a:p>
             <a:fld id="{4251665B-C24A-4702-B522-6A4334602E03}" type="datetimeFigureOut">
               <a:rPr lang="en-US" smtClean="0"/>
-              <a:t>18-Aug-24</a:t>
+              <a:t>08-Sep-24</a:t>
             </a:fld>
             <a:endParaRPr lang="en-US"/>
           </a:p>
@@ -8514,7 +8514,7 @@
           <a:p>
             <a:fld id="{4251665B-C24A-4702-B522-6A4334602E03}" type="datetimeFigureOut">
               <a:rPr lang="en-US" smtClean="0"/>
-              <a:t>18-Aug-24</a:t>
+              <a:t>08-Sep-24</a:t>
             </a:fld>
             <a:endParaRPr lang="en-US"/>
           </a:p>
@@ -21501,7 +21501,7 @@
         <p:spPr>
           <a:xfrm>
             <a:off x="4764499" y="2709791"/>
-            <a:ext cx="2253343" cy="430887"/>
+            <a:ext cx="2616015" cy="430887"/>
           </a:xfrm>
           <a:prstGeom prst="rect">
             <a:avLst/>
@@ -21518,7 +21518,7 @@
               <a:rPr lang="en-US" sz="2200" dirty="0">
                 <a:latin typeface="Perpetua" panose="02020502060401020303" pitchFamily="18" charset="0"/>
               </a:rPr>
-              <a:t>Message bit [0 1 0]</a:t>
+              <a:t>Message bit [1 0 1 0]</a:t>
             </a:r>
           </a:p>
         </p:txBody>

</xml_diff>